<commit_message>
Amélioration des slides sur la partie déploiement
</commit_message>
<xml_diff>
--- a/report/Projet_classification_MLOps_Partie4_Killian.pptx
+++ b/report/Projet_classification_MLOps_Partie4_Killian.pptx
@@ -245,7 +245,7 @@
           <a:p>
             <a:fld id="{F352A77B-D33C-49B3-A83C-450AA2ED72B3}" type="datetimeFigureOut">
               <a:rPr lang="en-US" smtClean="0"/>
-              <a:t>2/13/2025</a:t>
+              <a:t>2/19/2025</a:t>
             </a:fld>
             <a:endParaRPr lang="en-US" dirty="0"/>
           </a:p>
@@ -422,7 +422,7 @@
           <a:p>
             <a:fld id="{E38D8F9A-F5CB-4EF8-A859-ED5E107B9763}" type="datetimeFigureOut">
               <a:rPr lang="en-US" smtClean="0"/>
-              <a:t>2/13/2025</a:t>
+              <a:t>2/19/2025</a:t>
             </a:fld>
             <a:endParaRPr lang="en-US" dirty="0"/>
           </a:p>
@@ -16877,7 +16877,7 @@
         <p:spPr>
           <a:xfrm>
             <a:off x="838199" y="1198562"/>
-            <a:ext cx="11185897" cy="5094819"/>
+            <a:ext cx="11185897" cy="5315360"/>
           </a:xfrm>
         </p:spPr>
         <p:txBody>
@@ -16908,6 +16908,41 @@
             </a:r>
           </a:p>
           <a:p>
+            <a:pPr lvl="2"/>
+            <a:r>
+              <a:rPr lang="fr-FR" dirty="0"/>
+              <a:t>Référence aux versions des Dockers sous </a:t>
+            </a:r>
+            <a:r>
+              <a:rPr lang="fr-FR" dirty="0" err="1"/>
+              <a:t>DockerHub</a:t>
+            </a:r>
+            <a:endParaRPr lang="fr-FR" dirty="0"/>
+          </a:p>
+          <a:p>
+            <a:pPr lvl="2"/>
+            <a:r>
+              <a:rPr lang="fr-FR" dirty="0"/>
+              <a:t>Configuration des </a:t>
+            </a:r>
+            <a:r>
+              <a:rPr lang="fr-FR" dirty="0" err="1"/>
+              <a:t>Nodes</a:t>
+            </a:r>
+            <a:r>
+              <a:rPr lang="fr-FR" dirty="0"/>
+              <a:t> </a:t>
+            </a:r>
+            <a:r>
+              <a:rPr lang="fr-FR" dirty="0" err="1"/>
+              <a:t>Kubernetes</a:t>
+            </a:r>
+            <a:r>
+              <a:rPr lang="fr-FR" dirty="0"/>
+              <a:t> associés</a:t>
+            </a:r>
+          </a:p>
+          <a:p>
             <a:r>
               <a:rPr lang="fr-FR" dirty="0"/>
               <a:t>Jenkins sur Git - </a:t>
@@ -16960,34 +16995,6 @@
             <a:endParaRPr lang="fr-FR" dirty="0"/>
           </a:p>
           <a:p>
-            <a:pPr lvl="1"/>
-            <a:r>
-              <a:rPr lang="fr-FR" dirty="0" err="1"/>
-              <a:t>Synchronize</a:t>
-            </a:r>
-            <a:r>
-              <a:rPr lang="fr-FR" dirty="0"/>
-              <a:t> </a:t>
-            </a:r>
-            <a:r>
-              <a:rPr lang="fr-FR" b="1" dirty="0"/>
-              <a:t>Repo code source </a:t>
-            </a:r>
-            <a:r>
-              <a:rPr lang="fr-FR" dirty="0">
-                <a:sym typeface="Wingdings" panose="05000000000000000000" pitchFamily="2" charset="2"/>
-              </a:rPr>
-              <a:t>// </a:t>
-            </a:r>
-            <a:r>
-              <a:rPr lang="fr-FR" b="1" dirty="0">
-                <a:sym typeface="Wingdings" panose="05000000000000000000" pitchFamily="2" charset="2"/>
-              </a:rPr>
-              <a:t>Repo code déploiement</a:t>
-            </a:r>
-            <a:endParaRPr lang="fr-FR" b="1" dirty="0"/>
-          </a:p>
-          <a:p>
             <a:r>
               <a:rPr lang="fr-FR" dirty="0" err="1"/>
               <a:t>ArgoCD</a:t>
@@ -17028,12 +17035,8 @@
           <a:p>
             <a:pPr lvl="1"/>
             <a:r>
-              <a:rPr lang="fr-FR" dirty="0" err="1"/>
-              <a:t>Deploie</a:t>
-            </a:r>
-            <a:r>
               <a:rPr lang="fr-FR" dirty="0"/>
-              <a:t> les Dockers sur </a:t>
+              <a:t>Déploie les Dockers sur </a:t>
             </a:r>
             <a:r>
               <a:rPr lang="fr-FR" dirty="0" err="1"/>
@@ -17598,56 +17601,18 @@
               <a:buNone/>
             </a:pPr>
             <a:r>
-              <a:rPr lang="fr-FR" sz="2400" dirty="0"/>
-              <a:t>Scripts lancés sur commit/repo code source</a:t>
-            </a:r>
-          </a:p>
-          <a:p>
-            <a:pPr lvl="1"/>
-            <a:r>
-              <a:rPr lang="fr-FR" sz="2000" dirty="0"/>
-              <a:t>Lancer les tests unitaires et vérifier si les tests sont </a:t>
-            </a:r>
-            <a:r>
-              <a:rPr lang="fr-FR" sz="2000" dirty="0" err="1"/>
-              <a:t>pass</a:t>
-            </a:r>
-            <a:endParaRPr lang="fr-FR" sz="2000" dirty="0"/>
-          </a:p>
-          <a:p>
-            <a:pPr lvl="1"/>
-            <a:r>
-              <a:rPr lang="fr-FR" sz="2000" dirty="0" err="1"/>
-              <a:t>Build</a:t>
-            </a:r>
-            <a:r>
-              <a:rPr lang="fr-FR" sz="2000" dirty="0"/>
-              <a:t> des dockers et vérifier si les tests d’intégration sont </a:t>
-            </a:r>
-            <a:r>
-              <a:rPr lang="fr-FR" sz="2000" dirty="0" err="1"/>
-              <a:t>pass</a:t>
-            </a:r>
-            <a:endParaRPr lang="fr-FR" sz="2000" dirty="0"/>
-          </a:p>
-          <a:p>
-            <a:pPr lvl="1"/>
-            <a:r>
-              <a:rPr lang="fr-FR" sz="2000" dirty="0"/>
-              <a:t>Push sur </a:t>
-            </a:r>
-            <a:r>
-              <a:rPr lang="fr-FR" sz="2000" dirty="0" err="1"/>
-              <a:t>DockerHub</a:t>
-            </a:r>
-            <a:endParaRPr lang="fr-FR" sz="2000" dirty="0"/>
-          </a:p>
-          <a:p>
-            <a:pPr lvl="1"/>
-            <a:r>
-              <a:rPr lang="fr-FR" sz="2000" dirty="0"/>
-              <a:t>Synchro Repo code source || Repo code déploiement</a:t>
-            </a:r>
+              <a:rPr lang="fr-FR" sz="2400" dirty="0">
+                <a:solidFill>
+                  <a:srgbClr val="FF0000"/>
+                </a:solidFill>
+              </a:rPr>
+              <a:t>Ici : Montrer à la place un exemple de script Jenkins</a:t>
+            </a:r>
+            <a:endParaRPr lang="fr-FR" sz="2000" dirty="0">
+              <a:solidFill>
+                <a:srgbClr val="FF0000"/>
+              </a:solidFill>
+            </a:endParaRPr>
           </a:p>
         </p:txBody>
       </p:sp>
@@ -20928,15 +20893,6 @@
 </file>
 
 <file path=customXml/item1.xml><?xml version="1.0" encoding="utf-8"?>
-<?mso-contentType ?>
-<FormTemplates xmlns="http://schemas.microsoft.com/sharepoint/v3/contenttype/forms">
-  <Display>DocumentLibraryForm</Display>
-  <Edit>DocumentLibraryForm</Edit>
-  <New>DocumentLibraryForm</New>
-</FormTemplates>
-</file>
-
-<file path=customXml/item2.xml><?xml version="1.0" encoding="utf-8"?>
 <ct:contentTypeSchema xmlns:ct="http://schemas.microsoft.com/office/2006/metadata/contentType" xmlns:ma="http://schemas.microsoft.com/office/2006/metadata/properties/metaAttributes" ct:_="" ma:_="" ma:contentTypeName="Document" ma:contentTypeID="0x01010079F111ED35F8CC479449609E8A0923A6" ma:contentTypeVersion="27" ma:contentTypeDescription="Create a new document." ma:contentTypeScope="" ma:versionID="c6f9a84f66a9c8b9a21755b9ffafb945">
   <xsd:schema xmlns:xsd="http://www.w3.org/2001/XMLSchema" xmlns:xs="http://www.w3.org/2001/XMLSchema" xmlns:p="http://schemas.microsoft.com/office/2006/metadata/properties" xmlns:ns1="http://schemas.microsoft.com/sharepoint/v3" xmlns:ns2="71af3243-3dd4-4a8d-8c0d-dd76da1f02a5" xmlns:ns3="16c05727-aa75-4e4a-9b5f-8a80a1165891" xmlns:ns4="230e9df3-be65-4c73-a93b-d1236ebd677e" targetNamespace="http://schemas.microsoft.com/office/2006/metadata/properties" ma:root="true" ma:fieldsID="27df39e3e7036dff54f89ddd5805ce72" ns1:_="" ns2:_="" ns3:_="" ns4:_="">
     <xsd:import namespace="http://schemas.microsoft.com/sharepoint/v3"/>
@@ -21242,6 +21198,15 @@
 </ct:contentTypeSchema>
 </file>
 
+<file path=customXml/item2.xml><?xml version="1.0" encoding="utf-8"?>
+<?mso-contentType ?>
+<FormTemplates xmlns="http://schemas.microsoft.com/sharepoint/v3/contenttype/forms">
+  <Display>DocumentLibraryForm</Display>
+  <Edit>DocumentLibraryForm</Edit>
+  <New>DocumentLibraryForm</New>
+</FormTemplates>
+</file>
+
 <file path=customXml/item3.xml><?xml version="1.0" encoding="utf-8"?>
 <p:properties xmlns:p="http://schemas.microsoft.com/office/2006/metadata/properties" xmlns:xsi="http://www.w3.org/2001/XMLSchema-instance" xmlns:pc="http://schemas.microsoft.com/office/infopath/2007/PartnerControls">
   <documentManagement>
@@ -21263,14 +21228,6 @@
 </file>
 
 <file path=customXml/itemProps1.xml><?xml version="1.0" encoding="utf-8"?>
-<ds:datastoreItem xmlns:ds="http://schemas.openxmlformats.org/officeDocument/2006/customXml" ds:itemID="{79BF405E-7930-4D5C-ABB3-493E9D6D6CEA}">
-  <ds:schemaRefs>
-    <ds:schemaRef ds:uri="http://schemas.microsoft.com/sharepoint/v3/contenttype/forms"/>
-  </ds:schemaRefs>
-</ds:datastoreItem>
-</file>
-
-<file path=customXml/itemProps2.xml><?xml version="1.0" encoding="utf-8"?>
 <ds:datastoreItem xmlns:ds="http://schemas.openxmlformats.org/officeDocument/2006/customXml" ds:itemID="{2C1F447F-FAA8-4106-988B-648F3C8EDB2D}">
   <ds:schemaRefs>
     <ds:schemaRef ds:uri="http://schemas.microsoft.com/office/2006/metadata/contentType"/>
@@ -21291,6 +21248,14 @@
 </ds:datastoreItem>
 </file>
 
+<file path=customXml/itemProps2.xml><?xml version="1.0" encoding="utf-8"?>
+<ds:datastoreItem xmlns:ds="http://schemas.openxmlformats.org/officeDocument/2006/customXml" ds:itemID="{79BF405E-7930-4D5C-ABB3-493E9D6D6CEA}">
+  <ds:schemaRefs>
+    <ds:schemaRef ds:uri="http://schemas.microsoft.com/sharepoint/v3/contenttype/forms"/>
+  </ds:schemaRefs>
+</ds:datastoreItem>
+</file>
+
 <file path=customXml/itemProps3.xml><?xml version="1.0" encoding="utf-8"?>
 <ds:datastoreItem xmlns:ds="http://schemas.openxmlformats.org/officeDocument/2006/customXml" ds:itemID="{6EA97235-BEC4-4F82-87A8-2F5DAD53B5F9}">
   <ds:schemaRefs>

</xml_diff>